<commit_message>
Fixed a bug in the foreign key delete trigger.
</commit_message>
<xml_diff>
--- a/Slides/SQL Saturday 840.pptx
+++ b/Slides/SQL Saturday 840.pptx
@@ -3842,7 +3842,7 @@
         <p:spPr/>
         <p:txBody>
           <a:bodyPr>
-            <a:normAutofit fontScale="62500" lnSpcReduction="20000"/>
+            <a:normAutofit fontScale="47500" lnSpcReduction="20000"/>
           </a:bodyPr>
           <a:lstStyle/>
           <a:p>
@@ -3858,66 +3858,29 @@
               <a:rPr lang="en-CA" dirty="0"/>
               <a:t> ON Customers FOR DELETE AS</a:t>
             </a:r>
-            <a:br>
+          </a:p>
+          <a:p>
+            <a:r>
               <a:rPr lang="en-CA" dirty="0"/>
-            </a:br>
+              <a:t>  IF EXISTS(</a:t>
+            </a:r>
+          </a:p>
+          <a:p>
             <a:r>
               <a:rPr lang="en-CA" dirty="0"/>
-              <a:t>  IF NOT EXISTS(</a:t>
-            </a:r>
-            <a:br>
-              <a:rPr lang="en-CA" dirty="0"/>
-            </a:br>
-            <a:r>
-              <a:rPr lang="en-CA" dirty="0"/>
-              <a:t>    SELECT *</a:t>
-            </a:r>
-            <a:br>
-              <a:rPr lang="en-CA" dirty="0"/>
-            </a:br>
-            <a:r>
-              <a:rPr lang="en-CA" dirty="0"/>
-              <a:t>    FROM Customers</a:t>
-            </a:r>
-            <a:br>
-              <a:rPr lang="en-CA" dirty="0"/>
-            </a:br>
-            <a:r>
-              <a:rPr lang="en-CA" dirty="0"/>
-              <a:t>    Where </a:t>
-            </a:r>
-            <a:r>
-              <a:rPr lang="en-CA" dirty="0" err="1"/>
-              <a:t>RecordId</a:t>
-            </a:r>
-            <a:r>
-              <a:rPr lang="en-CA" dirty="0"/>
-              <a:t> IN (</a:t>
-            </a:r>
-            <a:br>
-              <a:rPr lang="en-CA" dirty="0"/>
-            </a:br>
-            <a:r>
-              <a:rPr lang="en-CA" dirty="0"/>
-              <a:t>      SELECT </a:t>
-            </a:r>
-            <a:r>
-              <a:rPr lang="en-CA" dirty="0" err="1"/>
-              <a:t>CustomerRecId</a:t>
-            </a:r>
-            <a:br>
-              <a:rPr lang="en-CA" dirty="0"/>
-            </a:br>
+              <a:t>      SELECT *</a:t>
+            </a:r>
+          </a:p>
+          <a:p>
             <a:r>
               <a:rPr lang="en-CA" dirty="0"/>
               <a:t>      FROM Addresses</a:t>
             </a:r>
-            <a:br>
+          </a:p>
+          <a:p>
+            <a:r>
               <a:rPr lang="en-CA" dirty="0"/>
-            </a:br>
-            <a:r>
-              <a:rPr lang="en-CA" dirty="0"/>
-              <a:t>      INNER JOIN deleted On </a:t>
+              <a:t>      INNER JOIN deleted ON </a:t>
             </a:r>
             <a:r>
               <a:rPr lang="en-CA" dirty="0" err="1"/>
@@ -3929,32 +3892,98 @@
             </a:r>
             <a:r>
               <a:rPr lang="en-CA" dirty="0" err="1"/>
-              <a:t>CustomerRecId</a:t>
-            </a:r>
-            <a:br>
+              <a:t>Addresses.ContactRecId</a:t>
+            </a:r>
+            <a:endParaRPr lang="en-CA" dirty="0"/>
+          </a:p>
+          <a:p>
+            <a:r>
               <a:rPr lang="en-CA" dirty="0"/>
-            </a:br>
+              <a:t>      AND </a:t>
+            </a:r>
+            <a:r>
+              <a:rPr lang="en-CA" dirty="0" err="1"/>
+              <a:t>deleted.RecordId</a:t>
+            </a:r>
+            <a:r>
+              <a:rPr lang="en-CA" dirty="0"/>
+              <a:t> NOT IN (</a:t>
+            </a:r>
+          </a:p>
+          <a:p>
+            <a:r>
+              <a:rPr lang="en-CA" dirty="0"/>
+              <a:t>          SELECT </a:t>
+            </a:r>
+            <a:r>
+              <a:rPr lang="en-CA" dirty="0" err="1"/>
+              <a:t>Customers.RecordId</a:t>
+            </a:r>
+            <a:endParaRPr lang="en-CA" dirty="0"/>
+          </a:p>
+          <a:p>
+            <a:r>
+              <a:rPr lang="en-CA" dirty="0"/>
+              <a:t>          FROM Customers</a:t>
+            </a:r>
+          </a:p>
+          <a:p>
+            <a:r>
+              <a:rPr lang="en-CA" dirty="0"/>
+              <a:t>          WHERE </a:t>
+            </a:r>
+            <a:r>
+              <a:rPr lang="en-CA" dirty="0" err="1"/>
+              <a:t>Customers.Id</a:t>
+            </a:r>
+            <a:r>
+              <a:rPr lang="en-CA" dirty="0"/>
+              <a:t> &lt;&gt; </a:t>
+            </a:r>
+            <a:r>
+              <a:rPr lang="en-CA" dirty="0" err="1"/>
+              <a:t>deleted.Id</a:t>
+            </a:r>
+            <a:endParaRPr lang="en-CA" dirty="0"/>
+          </a:p>
+          <a:p>
+            <a:r>
+              <a:rPr lang="en-CA" dirty="0"/>
+              <a:t>          AND </a:t>
+            </a:r>
+            <a:r>
+              <a:rPr lang="en-CA" dirty="0" err="1"/>
+              <a:t>Customers.RecordId</a:t>
+            </a:r>
+            <a:r>
+              <a:rPr lang="en-CA" dirty="0"/>
+              <a:t> = </a:t>
+            </a:r>
+            <a:r>
+              <a:rPr lang="en-CA" dirty="0" err="1"/>
+              <a:t>deleted.RecordId</a:t>
+            </a:r>
+            <a:endParaRPr lang="en-CA" dirty="0"/>
+          </a:p>
+          <a:p>
             <a:r>
               <a:rPr lang="en-CA" dirty="0"/>
               <a:t>      )</a:t>
             </a:r>
-            <a:br>
-              <a:rPr lang="en-CA" dirty="0"/>
-            </a:br>
+          </a:p>
+          <a:p>
             <a:r>
               <a:rPr lang="en-CA" dirty="0"/>
               <a:t>    )</a:t>
             </a:r>
-            <a:br>
-              <a:rPr lang="en-CA" dirty="0"/>
-            </a:br>
+          </a:p>
+          <a:p>
             <a:r>
               <a:rPr lang="en-CA" dirty="0"/>
               <a:t>    BEGIN</a:t>
             </a:r>
-            <a:br>
-              <a:rPr lang="en-CA" dirty="0"/>
-            </a:br>
+          </a:p>
+          <a:p>
             <a:r>
               <a:rPr lang="en-CA" dirty="0"/>
               <a:t>      RAISERROR ('Tried to deleted Customers record that is referenced by Addresses </a:t>
@@ -3967,19 +3996,23 @@
               <a:rPr lang="en-CA" dirty="0"/>
               <a:t> key.', 16, 1);</a:t>
             </a:r>
-            <a:br>
-              <a:rPr lang="en-CA" dirty="0"/>
-            </a:br>
+          </a:p>
+          <a:p>
             <a:r>
               <a:rPr lang="en-CA" dirty="0"/>
               <a:t>      ROLLBACK;</a:t>
             </a:r>
-            <a:br>
-              <a:rPr lang="en-CA" dirty="0"/>
-            </a:br>
+          </a:p>
+          <a:p>
             <a:r>
               <a:rPr lang="en-CA" dirty="0"/>
               <a:t>    END</a:t>
+            </a:r>
+          </a:p>
+          <a:p>
+            <a:r>
+              <a:rPr lang="en-CA" dirty="0"/>
+              <a:t>GO</a:t>
             </a:r>
           </a:p>
         </p:txBody>

</xml_diff>